<commit_message>
Updated experimental and SAR tables
</commit_message>
<xml_diff>
--- a/Paper files/SAR_Tables_Paper.pptx
+++ b/Paper files/SAR_Tables_Paper.pptx
@@ -252,7 +252,7 @@
           <a:p>
             <a:fld id="{2D85E8BA-DC60-4B90-B41C-2E99493F9ADA}" type="datetimeFigureOut">
               <a:rPr lang="en-US" smtClean="0"/>
-              <a:t>1/4/2022</a:t>
+              <a:t>1/19/2022</a:t>
             </a:fld>
             <a:endParaRPr lang="en-US"/>
           </a:p>
@@ -422,7 +422,7 @@
           <a:p>
             <a:fld id="{2D85E8BA-DC60-4B90-B41C-2E99493F9ADA}" type="datetimeFigureOut">
               <a:rPr lang="en-US" smtClean="0"/>
-              <a:t>1/4/2022</a:t>
+              <a:t>1/19/2022</a:t>
             </a:fld>
             <a:endParaRPr lang="en-US"/>
           </a:p>
@@ -602,7 +602,7 @@
           <a:p>
             <a:fld id="{2D85E8BA-DC60-4B90-B41C-2E99493F9ADA}" type="datetimeFigureOut">
               <a:rPr lang="en-US" smtClean="0"/>
-              <a:t>1/4/2022</a:t>
+              <a:t>1/19/2022</a:t>
             </a:fld>
             <a:endParaRPr lang="en-US"/>
           </a:p>
@@ -772,7 +772,7 @@
           <a:p>
             <a:fld id="{2D85E8BA-DC60-4B90-B41C-2E99493F9ADA}" type="datetimeFigureOut">
               <a:rPr lang="en-US" smtClean="0"/>
-              <a:t>1/4/2022</a:t>
+              <a:t>1/19/2022</a:t>
             </a:fld>
             <a:endParaRPr lang="en-US"/>
           </a:p>
@@ -1016,7 +1016,7 @@
           <a:p>
             <a:fld id="{2D85E8BA-DC60-4B90-B41C-2E99493F9ADA}" type="datetimeFigureOut">
               <a:rPr lang="en-US" smtClean="0"/>
-              <a:t>1/4/2022</a:t>
+              <a:t>1/19/2022</a:t>
             </a:fld>
             <a:endParaRPr lang="en-US"/>
           </a:p>
@@ -1248,7 +1248,7 @@
           <a:p>
             <a:fld id="{2D85E8BA-DC60-4B90-B41C-2E99493F9ADA}" type="datetimeFigureOut">
               <a:rPr lang="en-US" smtClean="0"/>
-              <a:t>1/4/2022</a:t>
+              <a:t>1/19/2022</a:t>
             </a:fld>
             <a:endParaRPr lang="en-US"/>
           </a:p>
@@ -1615,7 +1615,7 @@
           <a:p>
             <a:fld id="{2D85E8BA-DC60-4B90-B41C-2E99493F9ADA}" type="datetimeFigureOut">
               <a:rPr lang="en-US" smtClean="0"/>
-              <a:t>1/4/2022</a:t>
+              <a:t>1/19/2022</a:t>
             </a:fld>
             <a:endParaRPr lang="en-US"/>
           </a:p>
@@ -1733,7 +1733,7 @@
           <a:p>
             <a:fld id="{2D85E8BA-DC60-4B90-B41C-2E99493F9ADA}" type="datetimeFigureOut">
               <a:rPr lang="en-US" smtClean="0"/>
-              <a:t>1/4/2022</a:t>
+              <a:t>1/19/2022</a:t>
             </a:fld>
             <a:endParaRPr lang="en-US"/>
           </a:p>
@@ -1828,7 +1828,7 @@
           <a:p>
             <a:fld id="{2D85E8BA-DC60-4B90-B41C-2E99493F9ADA}" type="datetimeFigureOut">
               <a:rPr lang="en-US" smtClean="0"/>
-              <a:t>1/4/2022</a:t>
+              <a:t>1/19/2022</a:t>
             </a:fld>
             <a:endParaRPr lang="en-US"/>
           </a:p>
@@ -2105,7 +2105,7 @@
           <a:p>
             <a:fld id="{2D85E8BA-DC60-4B90-B41C-2E99493F9ADA}" type="datetimeFigureOut">
               <a:rPr lang="en-US" smtClean="0"/>
-              <a:t>1/4/2022</a:t>
+              <a:t>1/19/2022</a:t>
             </a:fld>
             <a:endParaRPr lang="en-US"/>
           </a:p>
@@ -2362,7 +2362,7 @@
           <a:p>
             <a:fld id="{2D85E8BA-DC60-4B90-B41C-2E99493F9ADA}" type="datetimeFigureOut">
               <a:rPr lang="en-US" smtClean="0"/>
-              <a:t>1/4/2022</a:t>
+              <a:t>1/19/2022</a:t>
             </a:fld>
             <a:endParaRPr lang="en-US"/>
           </a:p>
@@ -2575,7 +2575,7 @@
           <a:p>
             <a:fld id="{2D85E8BA-DC60-4B90-B41C-2E99493F9ADA}" type="datetimeFigureOut">
               <a:rPr lang="en-US" smtClean="0"/>
-              <a:t>1/4/2022</a:t>
+              <a:t>1/19/2022</a:t>
             </a:fld>
             <a:endParaRPr lang="en-US"/>
           </a:p>
@@ -5406,7 +5406,7 @@
           <a:graphicData uri="http://schemas.openxmlformats.org/presentationml/2006/ole">
             <mc:AlternateContent xmlns:mc="http://schemas.openxmlformats.org/markup-compatibility/2006">
               <mc:Choice xmlns:v="urn:schemas-microsoft-com:vml" Requires="v">
-                <p:oleObj spid="_x0000_s7432" name="CS ChemDraw Drawing" r:id="rId3" imgW="1014794" imgH="773971" progId="ChemDraw.Document.6.0">
+                <p:oleObj spid="_x0000_s7439" name="CS ChemDraw Drawing" r:id="rId3" imgW="1014794" imgH="773971" progId="ChemDraw.Document.6.0">
                   <p:embed/>
                 </p:oleObj>
               </mc:Choice>
@@ -5475,7 +5475,7 @@
           <a:graphicData uri="http://schemas.openxmlformats.org/presentationml/2006/ole">
             <mc:AlternateContent xmlns:mc="http://schemas.openxmlformats.org/markup-compatibility/2006">
               <mc:Choice xmlns:v="urn:schemas-microsoft-com:vml" Requires="v">
-                <p:oleObj spid="_x0000_s7433" name="CS ChemDraw Drawing" r:id="rId5" imgW="866527" imgH="532910" progId="ChemDraw.Document.6.0">
+                <p:oleObj spid="_x0000_s7440" name="CS ChemDraw Drawing" r:id="rId5" imgW="866527" imgH="532910" progId="ChemDraw.Document.6.0">
                   <p:embed/>
                 </p:oleObj>
               </mc:Choice>
@@ -5544,7 +5544,7 @@
           <a:graphicData uri="http://schemas.openxmlformats.org/presentationml/2006/ole">
             <mc:AlternateContent xmlns:mc="http://schemas.openxmlformats.org/markup-compatibility/2006">
               <mc:Choice xmlns:v="urn:schemas-microsoft-com:vml" Requires="v">
-                <p:oleObj spid="_x0000_s7434" name="CS ChemDraw Drawing" r:id="rId7" imgW="1202018" imgH="1110546" progId="ChemDraw.Document.6.0">
+                <p:oleObj spid="_x0000_s7441" name="CS ChemDraw Drawing" r:id="rId7" imgW="1202018" imgH="1110546" progId="ChemDraw.Document.6.0">
                   <p:embed/>
                 </p:oleObj>
               </mc:Choice>
@@ -5613,7 +5613,7 @@
           <a:graphicData uri="http://schemas.openxmlformats.org/presentationml/2006/ole">
             <mc:AlternateContent xmlns:mc="http://schemas.openxmlformats.org/markup-compatibility/2006">
               <mc:Choice xmlns:v="urn:schemas-microsoft-com:vml" Requires="v">
-                <p:oleObj spid="_x0000_s7435" name="CS ChemDraw Drawing" r:id="rId9" imgW="868419" imgH="532910" progId="ChemDraw.Document.6.0">
+                <p:oleObj spid="_x0000_s7442" name="CS ChemDraw Drawing" r:id="rId9" imgW="868419" imgH="532910" progId="ChemDraw.Document.6.0">
                   <p:embed/>
                 </p:oleObj>
               </mc:Choice>
@@ -5682,7 +5682,7 @@
           <a:graphicData uri="http://schemas.openxmlformats.org/presentationml/2006/ole">
             <mc:AlternateContent xmlns:mc="http://schemas.openxmlformats.org/markup-compatibility/2006">
               <mc:Choice xmlns:v="urn:schemas-microsoft-com:vml" Requires="v">
-                <p:oleObj spid="_x0000_s7436" name="CS ChemDraw Drawing" r:id="rId11" imgW="868419" imgH="532910" progId="ChemDraw.Document.6.0">
+                <p:oleObj spid="_x0000_s7443" name="CS ChemDraw Drawing" r:id="rId11" imgW="868419" imgH="532910" progId="ChemDraw.Document.6.0">
                   <p:embed/>
                 </p:oleObj>
               </mc:Choice>
@@ -5751,7 +5751,7 @@
           <a:graphicData uri="http://schemas.openxmlformats.org/presentationml/2006/ole">
             <mc:AlternateContent xmlns:mc="http://schemas.openxmlformats.org/markup-compatibility/2006">
               <mc:Choice xmlns:v="urn:schemas-microsoft-com:vml" Requires="v">
-                <p:oleObj spid="_x0000_s7437" name="CS ChemDraw Drawing" r:id="rId13" imgW="417189" imgH="366897" progId="ChemDraw.Document.6.0">
+                <p:oleObj spid="_x0000_s7444" name="CS ChemDraw Drawing" r:id="rId13" imgW="417189" imgH="366897" progId="ChemDraw.Document.6.0">
                   <p:embed/>
                 </p:oleObj>
               </mc:Choice>
@@ -5820,7 +5820,7 @@
           <a:graphicData uri="http://schemas.openxmlformats.org/presentationml/2006/ole">
             <mc:AlternateContent xmlns:mc="http://schemas.openxmlformats.org/markup-compatibility/2006">
               <mc:Choice xmlns:v="urn:schemas-microsoft-com:vml" Requires="v">
-                <p:oleObj spid="_x0000_s7438" name="CS ChemDraw Drawing" r:id="rId15" imgW="339273" imgH="345672" progId="ChemDraw.Document.6.0">
+                <p:oleObj spid="_x0000_s7445" name="CS ChemDraw Drawing" r:id="rId15" imgW="339273" imgH="345672" progId="ChemDraw.Document.6.0">
                   <p:embed/>
                 </p:oleObj>
               </mc:Choice>
@@ -5947,7 +5947,7 @@
           <a:graphicData uri="http://schemas.openxmlformats.org/presentationml/2006/ole">
             <mc:AlternateContent xmlns:mc="http://schemas.openxmlformats.org/markup-compatibility/2006">
               <mc:Choice xmlns:v="urn:schemas-microsoft-com:vml" Requires="v">
-                <p:oleObj spid="_x0000_s1077" name="CS ChemDraw Drawing" r:id="rId3" imgW="1157760" imgH="1275120" progId="ChemDraw.Document.6.0">
+                <p:oleObj spid="_x0000_s1078" name="CS ChemDraw Drawing" r:id="rId3" imgW="1157760" imgH="1275120" progId="ChemDraw.Document.6.0">
                   <p:embed/>
                 </p:oleObj>
               </mc:Choice>
@@ -8009,7 +8009,7 @@
           <a:graphicData uri="http://schemas.openxmlformats.org/presentationml/2006/ole">
             <mc:AlternateContent xmlns:mc="http://schemas.openxmlformats.org/markup-compatibility/2006">
               <mc:Choice xmlns:v="urn:schemas-microsoft-com:vml" Requires="v">
-                <p:oleObj spid="_x0000_s2764" name="CS ChemDraw Drawing" r:id="rId3" imgW="1012903" imgH="773752" progId="ChemDraw.Document.6.0">
+                <p:oleObj spid="_x0000_s2778" name="CS ChemDraw Drawing" r:id="rId3" imgW="1012903" imgH="773752" progId="ChemDraw.Document.6.0">
                   <p:embed/>
                 </p:oleObj>
               </mc:Choice>
@@ -8078,7 +8078,7 @@
           <a:graphicData uri="http://schemas.openxmlformats.org/presentationml/2006/ole">
             <mc:AlternateContent xmlns:mc="http://schemas.openxmlformats.org/markup-compatibility/2006">
               <mc:Choice xmlns:v="urn:schemas-microsoft-com:vml" Requires="v">
-                <p:oleObj spid="_x0000_s2765" name="CS ChemDraw Drawing" r:id="rId5" imgW="902081" imgH="567871" progId="ChemDraw.Document.6.0">
+                <p:oleObj spid="_x0000_s2779" name="CS ChemDraw Drawing" r:id="rId5" imgW="902081" imgH="567871" progId="ChemDraw.Document.6.0">
                   <p:embed/>
                 </p:oleObj>
               </mc:Choice>
@@ -8147,7 +8147,7 @@
           <a:graphicData uri="http://schemas.openxmlformats.org/presentationml/2006/ole">
             <mc:AlternateContent xmlns:mc="http://schemas.openxmlformats.org/markup-compatibility/2006">
               <mc:Choice xmlns:v="urn:schemas-microsoft-com:vml" Requires="v">
-                <p:oleObj spid="_x0000_s2766" name="CS ChemDraw Drawing" r:id="rId7" imgW="866906" imgH="532803" progId="ChemDraw.Document.6.0">
+                <p:oleObj spid="_x0000_s2780" name="CS ChemDraw Drawing" r:id="rId7" imgW="866906" imgH="532803" progId="ChemDraw.Document.6.0">
                   <p:embed/>
                 </p:oleObj>
               </mc:Choice>
@@ -8216,7 +8216,7 @@
           <a:graphicData uri="http://schemas.openxmlformats.org/presentationml/2006/ole">
             <mc:AlternateContent xmlns:mc="http://schemas.openxmlformats.org/markup-compatibility/2006">
               <mc:Choice xmlns:v="urn:schemas-microsoft-com:vml" Requires="v">
-                <p:oleObj spid="_x0000_s2767" name="CS ChemDraw Drawing" r:id="rId9" imgW="868419" imgH="533180" progId="ChemDraw.Document.6.0">
+                <p:oleObj spid="_x0000_s2781" name="CS ChemDraw Drawing" r:id="rId9" imgW="868419" imgH="533180" progId="ChemDraw.Document.6.0">
                   <p:embed/>
                 </p:oleObj>
               </mc:Choice>
@@ -8285,7 +8285,7 @@
           <a:graphicData uri="http://schemas.openxmlformats.org/presentationml/2006/ole">
             <mc:AlternateContent xmlns:mc="http://schemas.openxmlformats.org/markup-compatibility/2006">
               <mc:Choice xmlns:v="urn:schemas-microsoft-com:vml" Requires="v">
-                <p:oleObj spid="_x0000_s2768" name="CS ChemDraw Drawing" r:id="rId11" imgW="866906" imgH="513195" progId="ChemDraw.Document.6.0">
+                <p:oleObj spid="_x0000_s2782" name="CS ChemDraw Drawing" r:id="rId11" imgW="866906" imgH="513195" progId="ChemDraw.Document.6.0">
                   <p:embed/>
                 </p:oleObj>
               </mc:Choice>
@@ -8354,7 +8354,7 @@
           <a:graphicData uri="http://schemas.openxmlformats.org/presentationml/2006/ole">
             <mc:AlternateContent xmlns:mc="http://schemas.openxmlformats.org/markup-compatibility/2006">
               <mc:Choice xmlns:v="urn:schemas-microsoft-com:vml" Requires="v">
-                <p:oleObj spid="_x0000_s2769" name="CS ChemDraw Drawing" r:id="rId13" imgW="868040" imgH="513195" progId="ChemDraw.Document.6.0">
+                <p:oleObj spid="_x0000_s2783" name="CS ChemDraw Drawing" r:id="rId13" imgW="868040" imgH="513195" progId="ChemDraw.Document.6.0">
                   <p:embed/>
                 </p:oleObj>
               </mc:Choice>
@@ -8423,7 +8423,7 @@
           <a:graphicData uri="http://schemas.openxmlformats.org/presentationml/2006/ole">
             <mc:AlternateContent xmlns:mc="http://schemas.openxmlformats.org/markup-compatibility/2006">
               <mc:Choice xmlns:v="urn:schemas-microsoft-com:vml" Requires="v">
-                <p:oleObj spid="_x0000_s2770" name="CS ChemDraw Drawing" r:id="rId15" imgW="866527" imgH="533180" progId="ChemDraw.Document.6.0">
+                <p:oleObj spid="_x0000_s2784" name="CS ChemDraw Drawing" r:id="rId15" imgW="866527" imgH="533180" progId="ChemDraw.Document.6.0">
                   <p:embed/>
                 </p:oleObj>
               </mc:Choice>
@@ -8492,7 +8492,7 @@
           <a:graphicData uri="http://schemas.openxmlformats.org/presentationml/2006/ole">
             <mc:AlternateContent xmlns:mc="http://schemas.openxmlformats.org/markup-compatibility/2006">
               <mc:Choice xmlns:v="urn:schemas-microsoft-com:vml" Requires="v">
-                <p:oleObj spid="_x0000_s2771" name="CS ChemDraw Drawing" r:id="rId17" imgW="868419" imgH="531672" progId="ChemDraw.Document.6.0">
+                <p:oleObj spid="_x0000_s2785" name="CS ChemDraw Drawing" r:id="rId17" imgW="868419" imgH="531672" progId="ChemDraw.Document.6.0">
                   <p:embed/>
                 </p:oleObj>
               </mc:Choice>
@@ -8561,7 +8561,7 @@
           <a:graphicData uri="http://schemas.openxmlformats.org/presentationml/2006/ole">
             <mc:AlternateContent xmlns:mc="http://schemas.openxmlformats.org/markup-compatibility/2006">
               <mc:Choice xmlns:v="urn:schemas-microsoft-com:vml" Requires="v">
-                <p:oleObj spid="_x0000_s2772" name="CS ChemDraw Drawing" r:id="rId19" imgW="868419" imgH="513195" progId="ChemDraw.Document.6.0">
+                <p:oleObj spid="_x0000_s2786" name="CS ChemDraw Drawing" r:id="rId19" imgW="868419" imgH="513195" progId="ChemDraw.Document.6.0">
                   <p:embed/>
                 </p:oleObj>
               </mc:Choice>
@@ -8630,7 +8630,7 @@
           <a:graphicData uri="http://schemas.openxmlformats.org/presentationml/2006/ole">
             <mc:AlternateContent xmlns:mc="http://schemas.openxmlformats.org/markup-compatibility/2006">
               <mc:Choice xmlns:v="urn:schemas-microsoft-com:vml" Requires="v">
-                <p:oleObj spid="_x0000_s2773" name="CS ChemDraw Drawing" r:id="rId21" imgW="1122590" imgH="584837" progId="ChemDraw.Document.6.0">
+                <p:oleObj spid="_x0000_s2787" name="CS ChemDraw Drawing" r:id="rId21" imgW="1122590" imgH="584837" progId="ChemDraw.Document.6.0">
                   <p:embed/>
                 </p:oleObj>
               </mc:Choice>
@@ -8699,7 +8699,7 @@
           <a:graphicData uri="http://schemas.openxmlformats.org/presentationml/2006/ole">
             <mc:AlternateContent xmlns:mc="http://schemas.openxmlformats.org/markup-compatibility/2006">
               <mc:Choice xmlns:v="urn:schemas-microsoft-com:vml" Requires="v">
-                <p:oleObj spid="_x0000_s2774" name="CS ChemDraw Drawing" r:id="rId23" imgW="700484" imgH="615382" progId="ChemDraw.Document.6.0">
+                <p:oleObj spid="_x0000_s2788" name="CS ChemDraw Drawing" r:id="rId23" imgW="700484" imgH="615382" progId="ChemDraw.Document.6.0">
                   <p:embed/>
                 </p:oleObj>
               </mc:Choice>
@@ -8768,7 +8768,7 @@
           <a:graphicData uri="http://schemas.openxmlformats.org/presentationml/2006/ole">
             <mc:AlternateContent xmlns:mc="http://schemas.openxmlformats.org/markup-compatibility/2006">
               <mc:Choice xmlns:v="urn:schemas-microsoft-com:vml" Requires="v">
-                <p:oleObj spid="_x0000_s2775" name="CS ChemDraw Drawing" r:id="rId25" imgW="901703" imgH="513195" progId="ChemDraw.Document.6.0">
+                <p:oleObj spid="_x0000_s2789" name="CS ChemDraw Drawing" r:id="rId25" imgW="901703" imgH="513195" progId="ChemDraw.Document.6.0">
                   <p:embed/>
                 </p:oleObj>
               </mc:Choice>
@@ -8837,7 +8837,7 @@
           <a:graphicData uri="http://schemas.openxmlformats.org/presentationml/2006/ole">
             <mc:AlternateContent xmlns:mc="http://schemas.openxmlformats.org/markup-compatibility/2006">
               <mc:Choice xmlns:v="urn:schemas-microsoft-com:vml" Requires="v">
-                <p:oleObj spid="_x0000_s2776" name="CS ChemDraw Drawing" r:id="rId27" imgW="868419" imgH="531672" progId="ChemDraw.Document.6.0">
+                <p:oleObj spid="_x0000_s2790" name="CS ChemDraw Drawing" r:id="rId27" imgW="868419" imgH="531672" progId="ChemDraw.Document.6.0">
                   <p:embed/>
                 </p:oleObj>
               </mc:Choice>
@@ -8906,7 +8906,7 @@
           <a:graphicData uri="http://schemas.openxmlformats.org/presentationml/2006/ole">
             <mc:AlternateContent xmlns:mc="http://schemas.openxmlformats.org/markup-compatibility/2006">
               <mc:Choice xmlns:v="urn:schemas-microsoft-com:vml" Requires="v">
-                <p:oleObj spid="_x0000_s2777" name="CS ChemDraw Drawing" r:id="rId29" imgW="1045053" imgH="531672" progId="ChemDraw.Document.6.0">
+                <p:oleObj spid="_x0000_s2791" name="CS ChemDraw Drawing" r:id="rId29" imgW="1045053" imgH="531672" progId="ChemDraw.Document.6.0">
                   <p:embed/>
                 </p:oleObj>
               </mc:Choice>
@@ -12161,7 +12161,7 @@
           <a:graphicData uri="http://schemas.openxmlformats.org/presentationml/2006/ole">
             <mc:AlternateContent xmlns:mc="http://schemas.openxmlformats.org/markup-compatibility/2006">
               <mc:Choice xmlns:v="urn:schemas-microsoft-com:vml" Requires="v">
-                <p:oleObj spid="_x0000_s16172" name="CS ChemDraw Drawing" r:id="rId3" imgW="1118051" imgH="1022233" progId="ChemDraw.Document.6.0">
+                <p:oleObj spid="_x0000_s16175" name="CS ChemDraw Drawing" r:id="rId3" imgW="1118051" imgH="1022233" progId="ChemDraw.Document.6.0">
                   <p:embed/>
                 </p:oleObj>
               </mc:Choice>
@@ -12265,7 +12265,7 @@
           <a:graphicData uri="http://schemas.openxmlformats.org/presentationml/2006/ole">
             <mc:AlternateContent xmlns:mc="http://schemas.openxmlformats.org/markup-compatibility/2006">
               <mc:Choice xmlns:v="urn:schemas-microsoft-com:vml" Requires="v">
-                <p:oleObj spid="_x0000_s16173" name="CS ChemDraw Drawing" r:id="rId5" imgW="1180459" imgH="1140868" progId="ChemDraw.Document.6.0">
+                <p:oleObj spid="_x0000_s16176" name="CS ChemDraw Drawing" r:id="rId5" imgW="1180459" imgH="1140868" progId="ChemDraw.Document.6.0">
                   <p:embed/>
                 </p:oleObj>
               </mc:Choice>
@@ -12334,7 +12334,7 @@
           <a:graphicData uri="http://schemas.openxmlformats.org/presentationml/2006/ole">
             <mc:AlternateContent xmlns:mc="http://schemas.openxmlformats.org/markup-compatibility/2006">
               <mc:Choice xmlns:v="urn:schemas-microsoft-com:vml" Requires="v">
-                <p:oleObj spid="_x0000_s16174" name="CS ChemDraw Drawing" r:id="rId7" imgW="743224" imgH="514717" progId="ChemDraw.Document.6.0">
+                <p:oleObj spid="_x0000_s16177" name="CS ChemDraw Drawing" r:id="rId7" imgW="743224" imgH="514717" progId="ChemDraw.Document.6.0">
                   <p:embed/>
                 </p:oleObj>
               </mc:Choice>
@@ -14381,7 +14381,7 @@
           <a:graphicData uri="http://schemas.openxmlformats.org/presentationml/2006/ole">
             <mc:AlternateContent xmlns:mc="http://schemas.openxmlformats.org/markup-compatibility/2006">
               <mc:Choice xmlns:v="urn:schemas-microsoft-com:vml" Requires="v">
-                <p:oleObj spid="_x0000_s16980" name="CS ChemDraw Drawing" r:id="rId3" imgW="1042027" imgH="1087804" progId="ChemDraw.Document.6.0">
+                <p:oleObj spid="_x0000_s16993" name="CS ChemDraw Drawing" r:id="rId3" imgW="1042027" imgH="1087804" progId="ChemDraw.Document.6.0">
                   <p:embed/>
                 </p:oleObj>
               </mc:Choice>
@@ -14450,7 +14450,7 @@
           <a:graphicData uri="http://schemas.openxmlformats.org/presentationml/2006/ole">
             <mc:AlternateContent xmlns:mc="http://schemas.openxmlformats.org/markup-compatibility/2006">
               <mc:Choice xmlns:v="urn:schemas-microsoft-com:vml" Requires="v">
-                <p:oleObj spid="_x0000_s16981" name="CS ChemDraw Drawing" r:id="rId5" imgW="517798" imgH="508274" progId="ChemDraw.Document.6.0">
+                <p:oleObj spid="_x0000_s16994" name="CS ChemDraw Drawing" r:id="rId5" imgW="517798" imgH="508274" progId="ChemDraw.Document.6.0">
                   <p:embed/>
                 </p:oleObj>
               </mc:Choice>
@@ -14519,7 +14519,7 @@
           <a:graphicData uri="http://schemas.openxmlformats.org/presentationml/2006/ole">
             <mc:AlternateContent xmlns:mc="http://schemas.openxmlformats.org/markup-compatibility/2006">
               <mc:Choice xmlns:v="urn:schemas-microsoft-com:vml" Requires="v">
-                <p:oleObj spid="_x0000_s16982" name="CS ChemDraw Drawing" r:id="rId7" imgW="595336" imgH="522298" progId="ChemDraw.Document.6.0">
+                <p:oleObj spid="_x0000_s16995" name="CS ChemDraw Drawing" r:id="rId7" imgW="595336" imgH="522298" progId="ChemDraw.Document.6.0">
                   <p:embed/>
                 </p:oleObj>
               </mc:Choice>
@@ -14588,7 +14588,7 @@
           <a:graphicData uri="http://schemas.openxmlformats.org/presentationml/2006/ole">
             <mc:AlternateContent xmlns:mc="http://schemas.openxmlformats.org/markup-compatibility/2006">
               <mc:Choice xmlns:v="urn:schemas-microsoft-com:vml" Requires="v">
-                <p:oleObj spid="_x0000_s16983" name="CS ChemDraw Drawing" r:id="rId9" imgW="847238" imgH="523814" progId="ChemDraw.Document.6.0">
+                <p:oleObj spid="_x0000_s16996" name="CS ChemDraw Drawing" r:id="rId9" imgW="847238" imgH="523814" progId="ChemDraw.Document.6.0">
                   <p:embed/>
                 </p:oleObj>
               </mc:Choice>
@@ -14657,7 +14657,7 @@
           <a:graphicData uri="http://schemas.openxmlformats.org/presentationml/2006/ole">
             <mc:AlternateContent xmlns:mc="http://schemas.openxmlformats.org/markup-compatibility/2006">
               <mc:Choice xmlns:v="urn:schemas-microsoft-com:vml" Requires="v">
-                <p:oleObj spid="_x0000_s16984" name="CS ChemDraw Drawing" r:id="rId11" imgW="909646" imgH="522298" progId="ChemDraw.Document.6.0">
+                <p:oleObj spid="_x0000_s16997" name="CS ChemDraw Drawing" r:id="rId11" imgW="909646" imgH="522298" progId="ChemDraw.Document.6.0">
                   <p:embed/>
                 </p:oleObj>
               </mc:Choice>
@@ -14726,7 +14726,7 @@
           <a:graphicData uri="http://schemas.openxmlformats.org/presentationml/2006/ole">
             <mc:AlternateContent xmlns:mc="http://schemas.openxmlformats.org/markup-compatibility/2006">
               <mc:Choice xmlns:v="urn:schemas-microsoft-com:vml" Requires="v">
-                <p:oleObj spid="_x0000_s16985" name="CS ChemDraw Drawing" r:id="rId13" imgW="1276908" imgH="523814" progId="ChemDraw.Document.6.0">
+                <p:oleObj spid="_x0000_s16998" name="CS ChemDraw Drawing" r:id="rId13" imgW="1276908" imgH="523814" progId="ChemDraw.Document.6.0">
                   <p:embed/>
                 </p:oleObj>
               </mc:Choice>
@@ -14795,7 +14795,7 @@
           <a:graphicData uri="http://schemas.openxmlformats.org/presentationml/2006/ole">
             <mc:AlternateContent xmlns:mc="http://schemas.openxmlformats.org/markup-compatibility/2006">
               <mc:Choice xmlns:v="urn:schemas-microsoft-com:vml" Requires="v">
-                <p:oleObj spid="_x0000_s16986" name="CS ChemDraw Drawing" r:id="rId15" imgW="1055643" imgH="575740" progId="ChemDraw.Document.6.0">
+                <p:oleObj spid="_x0000_s16999" name="CS ChemDraw Drawing" r:id="rId15" imgW="1055643" imgH="575740" progId="ChemDraw.Document.6.0">
                   <p:embed/>
                 </p:oleObj>
               </mc:Choice>
@@ -14864,7 +14864,7 @@
           <a:graphicData uri="http://schemas.openxmlformats.org/presentationml/2006/ole">
             <mc:AlternateContent xmlns:mc="http://schemas.openxmlformats.org/markup-compatibility/2006">
               <mc:Choice xmlns:v="urn:schemas-microsoft-com:vml" Requires="v">
-                <p:oleObj spid="_x0000_s16987" name="CS ChemDraw Drawing" r:id="rId17" imgW="1202018" imgH="1110925" progId="ChemDraw.Document.6.0">
+                <p:oleObj spid="_x0000_s17000" name="CS ChemDraw Drawing" r:id="rId17" imgW="1202018" imgH="1110925" progId="ChemDraw.Document.6.0">
                   <p:embed/>
                 </p:oleObj>
               </mc:Choice>
@@ -14933,7 +14933,7 @@
           <a:graphicData uri="http://schemas.openxmlformats.org/presentationml/2006/ole">
             <mc:AlternateContent xmlns:mc="http://schemas.openxmlformats.org/markup-compatibility/2006">
               <mc:Choice xmlns:v="urn:schemas-microsoft-com:vml" Requires="v">
-                <p:oleObj spid="_x0000_s16988" name="CS ChemDraw Drawing" r:id="rId19" imgW="1078715" imgH="1141247" progId="ChemDraw.Document.6.0">
+                <p:oleObj spid="_x0000_s17001" name="CS ChemDraw Drawing" r:id="rId19" imgW="1078715" imgH="1141247" progId="ChemDraw.Document.6.0">
                   <p:embed/>
                 </p:oleObj>
               </mc:Choice>
@@ -15002,7 +15002,7 @@
           <a:graphicData uri="http://schemas.openxmlformats.org/presentationml/2006/ole">
             <mc:AlternateContent xmlns:mc="http://schemas.openxmlformats.org/markup-compatibility/2006">
               <mc:Choice xmlns:v="urn:schemas-microsoft-com:vml" Requires="v">
-                <p:oleObj spid="_x0000_s16989" name="CS ChemDraw Drawing" r:id="rId21" imgW="595336" imgH="522298" progId="ChemDraw.Document.6.0">
+                <p:oleObj spid="_x0000_s17002" name="CS ChemDraw Drawing" r:id="rId21" imgW="595336" imgH="522298" progId="ChemDraw.Document.6.0">
                   <p:embed/>
                 </p:oleObj>
               </mc:Choice>
@@ -15071,7 +15071,7 @@
           <a:graphicData uri="http://schemas.openxmlformats.org/presentationml/2006/ole">
             <mc:AlternateContent xmlns:mc="http://schemas.openxmlformats.org/markup-compatibility/2006">
               <mc:Choice xmlns:v="urn:schemas-microsoft-com:vml" Requires="v">
-                <p:oleObj spid="_x0000_s16990" name="CS ChemDraw Drawing" r:id="rId22" imgW="595336" imgH="522298" progId="ChemDraw.Document.6.0">
+                <p:oleObj spid="_x0000_s17003" name="CS ChemDraw Drawing" r:id="rId22" imgW="595336" imgH="522298" progId="ChemDraw.Document.6.0">
                   <p:embed/>
                 </p:oleObj>
               </mc:Choice>
@@ -15140,7 +15140,7 @@
           <a:graphicData uri="http://schemas.openxmlformats.org/presentationml/2006/ole">
             <mc:AlternateContent xmlns:mc="http://schemas.openxmlformats.org/markup-compatibility/2006">
               <mc:Choice xmlns:v="urn:schemas-microsoft-com:vml" Requires="v">
-                <p:oleObj spid="_x0000_s16991" name="CS ChemDraw Drawing" r:id="rId24" imgW="839673" imgH="462791" progId="ChemDraw.Document.6.0">
+                <p:oleObj spid="_x0000_s17004" name="CS ChemDraw Drawing" r:id="rId24" imgW="839673" imgH="462791" progId="ChemDraw.Document.6.0">
                   <p:embed/>
                 </p:oleObj>
               </mc:Choice>
@@ -15209,7 +15209,7 @@
           <a:graphicData uri="http://schemas.openxmlformats.org/presentationml/2006/ole">
             <mc:AlternateContent xmlns:mc="http://schemas.openxmlformats.org/markup-compatibility/2006">
               <mc:Choice xmlns:v="urn:schemas-microsoft-com:vml" Requires="v">
-                <p:oleObj spid="_x0000_s16992" name="CS ChemDraw Drawing" r:id="rId5" imgW="517798" imgH="508274" progId="ChemDraw.Document.6.0">
+                <p:oleObj spid="_x0000_s17005" name="CS ChemDraw Drawing" r:id="rId5" imgW="517798" imgH="508274" progId="ChemDraw.Document.6.0">
                   <p:embed/>
                 </p:oleObj>
               </mc:Choice>
@@ -16837,7 +16837,7 @@
           <a:graphicData uri="http://schemas.openxmlformats.org/presentationml/2006/ole">
             <mc:AlternateContent xmlns:mc="http://schemas.openxmlformats.org/markup-compatibility/2006">
               <mc:Choice xmlns:v="urn:schemas-microsoft-com:vml" Requires="v">
-                <p:oleObj spid="_x0000_s30778" name="CS ChemDraw Drawing" r:id="rId3" imgW="1208070" imgH="1489951" progId="ChemDraw.Document.6.0">
+                <p:oleObj spid="_x0000_s30785" name="CS ChemDraw Drawing" r:id="rId3" imgW="1208070" imgH="1489951" progId="ChemDraw.Document.6.0">
                   <p:embed/>
                 </p:oleObj>
               </mc:Choice>
@@ -16906,7 +16906,7 @@
           <a:graphicData uri="http://schemas.openxmlformats.org/presentationml/2006/ole">
             <mc:AlternateContent xmlns:mc="http://schemas.openxmlformats.org/markup-compatibility/2006">
               <mc:Choice xmlns:v="urn:schemas-microsoft-com:vml" Requires="v">
-                <p:oleObj spid="_x0000_s30779" name="CS ChemDraw Drawing" r:id="rId5" imgW="761757" imgH="638280" progId="ChemDraw.Document.6.0">
+                <p:oleObj spid="_x0000_s30786" name="CS ChemDraw Drawing" r:id="rId5" imgW="761757" imgH="638280" progId="ChemDraw.Document.6.0">
                   <p:embed/>
                 </p:oleObj>
               </mc:Choice>
@@ -18241,7 +18241,7 @@
           <a:graphicData uri="http://schemas.openxmlformats.org/presentationml/2006/ole">
             <mc:AlternateContent xmlns:mc="http://schemas.openxmlformats.org/markup-compatibility/2006">
               <mc:Choice xmlns:v="urn:schemas-microsoft-com:vml" Requires="v">
-                <p:oleObj spid="_x0000_s30780" name="CS ChemDraw Drawing" r:id="rId7" imgW="1089306" imgH="1488814" progId="ChemDraw.Document.6.0">
+                <p:oleObj spid="_x0000_s30787" name="CS ChemDraw Drawing" r:id="rId7" imgW="1089306" imgH="1488814" progId="ChemDraw.Document.6.0">
                   <p:embed/>
                 </p:oleObj>
               </mc:Choice>
@@ -18310,7 +18310,7 @@
           <a:graphicData uri="http://schemas.openxmlformats.org/presentationml/2006/ole">
             <mc:AlternateContent xmlns:mc="http://schemas.openxmlformats.org/markup-compatibility/2006">
               <mc:Choice xmlns:v="urn:schemas-microsoft-com:vml" Requires="v">
-                <p:oleObj spid="_x0000_s30781" name="CS ChemDraw Drawing" r:id="rId9" imgW="613491" imgH="310422" progId="ChemDraw.Document.6.0">
+                <p:oleObj spid="_x0000_s30788" name="CS ChemDraw Drawing" r:id="rId9" imgW="613491" imgH="310422" progId="ChemDraw.Document.6.0">
                   <p:embed/>
                 </p:oleObj>
               </mc:Choice>
@@ -18379,7 +18379,7 @@
           <a:graphicData uri="http://schemas.openxmlformats.org/presentationml/2006/ole">
             <mc:AlternateContent xmlns:mc="http://schemas.openxmlformats.org/markup-compatibility/2006">
               <mc:Choice xmlns:v="urn:schemas-microsoft-com:vml" Requires="v">
-                <p:oleObj spid="_x0000_s30782" name="CS ChemDraw Drawing" r:id="rId11" imgW="426266" imgH="246367" progId="ChemDraw.Document.6.0">
+                <p:oleObj spid="_x0000_s30789" name="CS ChemDraw Drawing" r:id="rId11" imgW="426266" imgH="246367" progId="ChemDraw.Document.6.0">
                   <p:embed/>
                 </p:oleObj>
               </mc:Choice>
@@ -18448,7 +18448,7 @@
           <a:graphicData uri="http://schemas.openxmlformats.org/presentationml/2006/ole">
             <mc:AlternateContent xmlns:mc="http://schemas.openxmlformats.org/markup-compatibility/2006">
               <mc:Choice xmlns:v="urn:schemas-microsoft-com:vml" Requires="v">
-                <p:oleObj spid="_x0000_s30783" name="CS ChemDraw Drawing" r:id="rId13" imgW="585124" imgH="246746" progId="ChemDraw.Document.6.0">
+                <p:oleObj spid="_x0000_s30790" name="CS ChemDraw Drawing" r:id="rId13" imgW="585124" imgH="246746" progId="ChemDraw.Document.6.0">
                   <p:embed/>
                 </p:oleObj>
               </mc:Choice>
@@ -18517,7 +18517,7 @@
           <a:graphicData uri="http://schemas.openxmlformats.org/presentationml/2006/ole">
             <mc:AlternateContent xmlns:mc="http://schemas.openxmlformats.org/markup-compatibility/2006">
               <mc:Choice xmlns:v="urn:schemas-microsoft-com:vml" Requires="v">
-                <p:oleObj spid="_x0000_s30784" name="CS ChemDraw Drawing" r:id="rId15" imgW="585124" imgH="327478" progId="ChemDraw.Document.6.0">
+                <p:oleObj spid="_x0000_s30791" name="CS ChemDraw Drawing" r:id="rId15" imgW="585124" imgH="327478" progId="ChemDraw.Document.6.0">
                   <p:embed/>
                 </p:oleObj>
               </mc:Choice>
@@ -18638,14 +18638,14 @@
           <p:nvPr>
             <p:extLst>
               <p:ext uri="{D42A27DB-BD31-4B8C-83A1-F6EECF244321}">
-                <p14:modId xmlns:p14="http://schemas.microsoft.com/office/powerpoint/2010/main" val="1780021055"/>
+                <p14:modId xmlns:p14="http://schemas.microsoft.com/office/powerpoint/2010/main" val="1154554729"/>
               </p:ext>
             </p:extLst>
           </p:nvPr>
         </p:nvGraphicFramePr>
         <p:xfrm>
           <a:off x="1888958" y="1482868"/>
-          <a:ext cx="7537317" cy="6033827"/>
+          <a:ext cx="7537317" cy="5576627"/>
         </p:xfrm>
         <a:graphic>
           <a:graphicData uri="http://schemas.openxmlformats.org/drawingml/2006/table">
@@ -19370,10 +19370,6 @@
                       <a:pPr algn="ctr"/>
                       <a:endParaRPr lang="en-US" sz="1200" dirty="0"/>
                     </a:p>
-                    <a:p>
-                      <a:pPr algn="ctr"/>
-                      <a:endParaRPr lang="en-US" sz="1200" dirty="0"/>
-                    </a:p>
                   </a:txBody>
                   <a:tcPr anchor="ctr"/>
                 </a:tc>
@@ -19479,165 +19475,6 @@
                       <a:pPr algn="ctr"/>
                       <a:r>
                         <a:rPr lang="en-US" sz="1200" b="1" dirty="0"/>
-                        <a:t>1009</a:t>
-                      </a:r>
-                    </a:p>
-                  </a:txBody>
-                  <a:tcPr anchor="ctr"/>
-                </a:tc>
-                <a:tc>
-                  <a:txBody>
-                    <a:bodyPr/>
-                    <a:lstStyle/>
-                    <a:p>
-                      <a:pPr algn="ctr"/>
-                      <a:r>
-                        <a:rPr lang="en-US" sz="1200" dirty="0"/>
-                        <a:t>&gt;32</a:t>
-                      </a:r>
-                    </a:p>
-                  </a:txBody>
-                  <a:tcPr anchor="ctr">
-                    <a:solidFill>
-                      <a:srgbClr val="FF5050"/>
-                    </a:solidFill>
-                  </a:tcPr>
-                </a:tc>
-                <a:tc>
-                  <a:txBody>
-                    <a:bodyPr/>
-                    <a:lstStyle/>
-                    <a:p>
-                      <a:pPr algn="ctr"/>
-                      <a:r>
-                        <a:rPr lang="en-US" sz="1200" i="1" dirty="0" err="1"/>
-                        <a:t>nd</a:t>
-                      </a:r>
-                      <a:endParaRPr lang="en-US" sz="1200" i="1" dirty="0"/>
-                    </a:p>
-                  </a:txBody>
-                  <a:tcPr anchor="ctr"/>
-                </a:tc>
-                <a:extLst>
-                  <a:ext uri="{0D108BD9-81ED-4DB2-BD59-A6C34878D82A}">
-                    <a16:rowId xmlns:a16="http://schemas.microsoft.com/office/drawing/2014/main" val="246630105"/>
-                  </a:ext>
-                </a:extLst>
-              </a:tr>
-              <a:tr h="457200">
-                <a:tc>
-                  <a:txBody>
-                    <a:bodyPr/>
-                    <a:lstStyle/>
-                    <a:p>
-                      <a:pPr algn="ctr"/>
-                      <a:endParaRPr lang="en-US" sz="1200" dirty="0"/>
-                    </a:p>
-                  </a:txBody>
-                  <a:tcPr anchor="ctr"/>
-                </a:tc>
-                <a:tc>
-                  <a:txBody>
-                    <a:bodyPr/>
-                    <a:lstStyle/>
-                    <a:p>
-                      <a:pPr algn="ctr"/>
-                      <a:r>
-                        <a:rPr lang="en-US" sz="1200" b="1" dirty="0"/>
-                        <a:t>862</a:t>
-                      </a:r>
-                    </a:p>
-                  </a:txBody>
-                  <a:tcPr anchor="ctr"/>
-                </a:tc>
-                <a:tc>
-                  <a:txBody>
-                    <a:bodyPr/>
-                    <a:lstStyle/>
-                    <a:p>
-                      <a:pPr algn="ctr"/>
-                      <a:r>
-                        <a:rPr lang="en-US" sz="1200" dirty="0"/>
-                        <a:t>&gt;32</a:t>
-                      </a:r>
-                    </a:p>
-                  </a:txBody>
-                  <a:tcPr anchor="ctr">
-                    <a:solidFill>
-                      <a:srgbClr val="FF5050"/>
-                    </a:solidFill>
-                  </a:tcPr>
-                </a:tc>
-                <a:tc>
-                  <a:txBody>
-                    <a:bodyPr/>
-                    <a:lstStyle/>
-                    <a:p>
-                      <a:pPr algn="ctr"/>
-                      <a:r>
-                        <a:rPr lang="en-US" sz="1200" dirty="0"/>
-                        <a:t>&gt;32</a:t>
-                      </a:r>
-                    </a:p>
-                  </a:txBody>
-                  <a:tcPr anchor="ctr">
-                    <a:lnR w="28575" cap="flat" cmpd="sng" algn="ctr">
-                      <a:solidFill>
-                        <a:schemeClr val="tx1"/>
-                      </a:solidFill>
-                      <a:prstDash val="solid"/>
-                      <a:round/>
-                      <a:headEnd type="none" w="med" len="med"/>
-                      <a:tailEnd type="none" w="med" len="med"/>
-                    </a:lnR>
-                    <a:solidFill>
-                      <a:srgbClr val="FF5050"/>
-                    </a:solidFill>
-                  </a:tcPr>
-                </a:tc>
-                <a:tc>
-                  <a:txBody>
-                    <a:bodyPr/>
-                    <a:lstStyle/>
-                    <a:p>
-                      <a:pPr algn="ctr"/>
-                      <a:endParaRPr lang="en-US" sz="1200" dirty="0"/>
-                    </a:p>
-                  </a:txBody>
-                  <a:tcPr anchor="ctr">
-                    <a:lnL w="28575" cap="flat" cmpd="sng" algn="ctr">
-                      <a:solidFill>
-                        <a:schemeClr val="tx1"/>
-                      </a:solidFill>
-                      <a:prstDash val="solid"/>
-                      <a:round/>
-                      <a:headEnd type="none" w="med" len="med"/>
-                      <a:tailEnd type="none" w="med" len="med"/>
-                    </a:lnL>
-                  </a:tcPr>
-                </a:tc>
-                <a:tc>
-                  <a:txBody>
-                    <a:bodyPr/>
-                    <a:lstStyle/>
-                    <a:p>
-                      <a:pPr algn="ctr"/>
-                      <a:r>
-                        <a:rPr lang="en-US" sz="1200" dirty="0"/>
-                        <a:t>H</a:t>
-                      </a:r>
-                    </a:p>
-                  </a:txBody>
-                  <a:tcPr anchor="ctr"/>
-                </a:tc>
-                <a:tc>
-                  <a:txBody>
-                    <a:bodyPr/>
-                    <a:lstStyle/>
-                    <a:p>
-                      <a:pPr algn="ctr"/>
-                      <a:r>
-                        <a:rPr lang="en-US" sz="1200" b="1" dirty="0"/>
                         <a:t>1008</a:t>
                       </a:r>
                     </a:p>
@@ -19707,7 +19544,7 @@
                       <a:pPr algn="ctr"/>
                       <a:r>
                         <a:rPr lang="en-US" sz="1200" b="1" dirty="0"/>
-                        <a:t>869</a:t>
+                        <a:t>862</a:t>
                       </a:r>
                     </a:p>
                   </a:txBody>
@@ -19905,7 +19742,7 @@
                       <a:pPr algn="ctr"/>
                       <a:r>
                         <a:rPr lang="en-US" sz="1200" b="1" dirty="0"/>
-                        <a:t>873</a:t>
+                        <a:t>869</a:t>
                       </a:r>
                     </a:p>
                   </a:txBody>
@@ -20074,7 +19911,7 @@
                       <a:pPr algn="ctr"/>
                       <a:r>
                         <a:rPr lang="en-US" sz="1200" b="1" dirty="0"/>
-                        <a:t>874</a:t>
+                        <a:t>873</a:t>
                       </a:r>
                     </a:p>
                   </a:txBody>
@@ -20241,7 +20078,10 @@
                     <a:lstStyle/>
                     <a:p>
                       <a:pPr algn="ctr"/>
-                      <a:endParaRPr lang="en-US" sz="1200" dirty="0"/>
+                      <a:r>
+                        <a:rPr lang="en-US" sz="1200" b="1" dirty="0"/>
+                        <a:t>874</a:t>
+                      </a:r>
                     </a:p>
                   </a:txBody>
                   <a:tcPr anchor="ctr"/>
@@ -20252,7 +20092,10 @@
                     <a:lstStyle/>
                     <a:p>
                       <a:pPr algn="ctr"/>
-                      <a:endParaRPr lang="en-US" sz="1200" dirty="0"/>
+                      <a:r>
+                        <a:rPr lang="en-US" sz="1200" dirty="0"/>
+                        <a:t>&gt;32</a:t>
+                      </a:r>
                     </a:p>
                   </a:txBody>
                   <a:tcPr anchor="ctr"/>
@@ -20263,7 +20106,10 @@
                     <a:lstStyle/>
                     <a:p>
                       <a:pPr algn="ctr"/>
-                      <a:endParaRPr lang="en-US" sz="1200" dirty="0"/>
+                      <a:r>
+                        <a:rPr lang="en-US" sz="1200" dirty="0"/>
+                        <a:t>&gt;32</a:t>
+                      </a:r>
                     </a:p>
                   </a:txBody>
                   <a:tcPr anchor="ctr">
@@ -20754,7 +20600,7 @@
           <a:graphicData uri="http://schemas.openxmlformats.org/presentationml/2006/ole">
             <mc:AlternateContent xmlns:mc="http://schemas.openxmlformats.org/markup-compatibility/2006">
               <mc:Choice xmlns:v="urn:schemas-microsoft-com:vml" Requires="v">
-                <p:oleObj spid="_x0000_s5985" name="CS ChemDraw Drawing" r:id="rId3" imgW="1222065" imgH="881972" progId="ChemDraw.Document.6.0">
+                <p:oleObj spid="_x0000_s6002" name="CS ChemDraw Drawing" r:id="rId3" imgW="1222065" imgH="881972" progId="ChemDraw.Document.6.0">
                   <p:embed/>
                 </p:oleObj>
               </mc:Choice>
@@ -20823,7 +20669,7 @@
           <a:graphicData uri="http://schemas.openxmlformats.org/presentationml/2006/ole">
             <mc:AlternateContent xmlns:mc="http://schemas.openxmlformats.org/markup-compatibility/2006">
               <mc:Choice xmlns:v="urn:schemas-microsoft-com:vml" Requires="v">
-                <p:oleObj spid="_x0000_s5986" name="CS ChemDraw Drawing" r:id="rId5" imgW="589284" imgH="514704" progId="ChemDraw.Document.6.0">
+                <p:oleObj spid="_x0000_s6003" name="CS ChemDraw Drawing" r:id="rId5" imgW="589284" imgH="514704" progId="ChemDraw.Document.6.0">
                   <p:embed/>
                 </p:oleObj>
               </mc:Choice>
@@ -20892,7 +20738,7 @@
           <a:graphicData uri="http://schemas.openxmlformats.org/presentationml/2006/ole">
             <mc:AlternateContent xmlns:mc="http://schemas.openxmlformats.org/markup-compatibility/2006">
               <mc:Choice xmlns:v="urn:schemas-microsoft-com:vml" Requires="v">
-                <p:oleObj spid="_x0000_s5987" name="CS ChemDraw Drawing" r:id="rId7" imgW="630511" imgH="514704" progId="ChemDraw.Document.6.0">
+                <p:oleObj spid="_x0000_s6004" name="CS ChemDraw Drawing" r:id="rId7" imgW="630511" imgH="514704" progId="ChemDraw.Document.6.0">
                   <p:embed/>
                 </p:oleObj>
               </mc:Choice>
@@ -20961,7 +20807,7 @@
           <a:graphicData uri="http://schemas.openxmlformats.org/presentationml/2006/ole">
             <mc:AlternateContent xmlns:mc="http://schemas.openxmlformats.org/markup-compatibility/2006">
               <mc:Choice xmlns:v="urn:schemas-microsoft-com:vml" Requires="v">
-                <p:oleObj spid="_x0000_s5988" name="CS ChemDraw Drawing" r:id="rId9" imgW="630511" imgH="514704" progId="ChemDraw.Document.6.0">
+                <p:oleObj spid="_x0000_s6005" name="CS ChemDraw Drawing" r:id="rId9" imgW="630511" imgH="514704" progId="ChemDraw.Document.6.0">
                   <p:embed/>
                 </p:oleObj>
               </mc:Choice>
@@ -21030,7 +20876,7 @@
           <a:graphicData uri="http://schemas.openxmlformats.org/presentationml/2006/ole">
             <mc:AlternateContent xmlns:mc="http://schemas.openxmlformats.org/markup-compatibility/2006">
               <mc:Choice xmlns:v="urn:schemas-microsoft-com:vml" Requires="v">
-                <p:oleObj spid="_x0000_s5989" name="CS ChemDraw Drawing" r:id="rId11" imgW="587771" imgH="514704" progId="ChemDraw.Document.6.0">
+                <p:oleObj spid="_x0000_s6006" name="CS ChemDraw Drawing" r:id="rId11" imgW="587771" imgH="514704" progId="ChemDraw.Document.6.0">
                   <p:embed/>
                 </p:oleObj>
               </mc:Choice>
@@ -21099,7 +20945,7 @@
           <a:graphicData uri="http://schemas.openxmlformats.org/presentationml/2006/ole">
             <mc:AlternateContent xmlns:mc="http://schemas.openxmlformats.org/markup-compatibility/2006">
               <mc:Choice xmlns:v="urn:schemas-microsoft-com:vml" Requires="v">
-                <p:oleObj spid="_x0000_s5990" name="CS ChemDraw Drawing" r:id="rId13" imgW="589284" imgH="560200" progId="ChemDraw.Document.6.0">
+                <p:oleObj spid="_x0000_s6007" name="CS ChemDraw Drawing" r:id="rId13" imgW="589284" imgH="560200" progId="ChemDraw.Document.6.0">
                   <p:embed/>
                 </p:oleObj>
               </mc:Choice>
@@ -21155,20 +21001,20 @@
           <p:nvPr>
             <p:extLst>
               <p:ext uri="{D42A27DB-BD31-4B8C-83A1-F6EECF244321}">
-                <p14:modId xmlns:p14="http://schemas.microsoft.com/office/powerpoint/2010/main" val="2178986471"/>
+                <p14:modId xmlns:p14="http://schemas.microsoft.com/office/powerpoint/2010/main" val="3709567024"/>
               </p:ext>
             </p:extLst>
           </p:nvPr>
         </p:nvGraphicFramePr>
         <p:xfrm>
-          <a:off x="2031749" y="5445517"/>
+          <a:off x="2031749" y="5520161"/>
           <a:ext cx="474663" cy="419100"/>
         </p:xfrm>
         <a:graphic>
           <a:graphicData uri="http://schemas.openxmlformats.org/presentationml/2006/ole">
             <mc:AlternateContent xmlns:mc="http://schemas.openxmlformats.org/markup-compatibility/2006">
               <mc:Choice xmlns:v="urn:schemas-microsoft-com:vml" Requires="v">
-                <p:oleObj spid="_x0000_s5991" name="CS ChemDraw Drawing" r:id="rId15" imgW="630511" imgH="560579" progId="ChemDraw.Document.6.0">
+                <p:oleObj spid="_x0000_s6008" name="CS ChemDraw Drawing" r:id="rId15" imgW="630511" imgH="560579" progId="ChemDraw.Document.6.0">
                   <p:embed/>
                 </p:oleObj>
               </mc:Choice>
@@ -21195,7 +21041,7 @@
                     </p:blipFill>
                     <p:spPr>
                       <a:xfrm>
-                        <a:off x="2031749" y="5445517"/>
+                        <a:off x="2031749" y="5520161"/>
                         <a:ext cx="474663" cy="419100"/>
                       </a:xfrm>
                       <a:prstGeom prst="rect">
@@ -21237,7 +21083,7 @@
           <a:graphicData uri="http://schemas.openxmlformats.org/presentationml/2006/ole">
             <mc:AlternateContent xmlns:mc="http://schemas.openxmlformats.org/markup-compatibility/2006">
               <mc:Choice xmlns:v="urn:schemas-microsoft-com:vml" Requires="v">
-                <p:oleObj spid="_x0000_s5992" name="CS ChemDraw Drawing" r:id="rId17" imgW="947469" imgH="1259882" progId="ChemDraw.Document.6.0">
+                <p:oleObj spid="_x0000_s6009" name="CS ChemDraw Drawing" r:id="rId17" imgW="947469" imgH="1259882" progId="ChemDraw.Document.6.0">
                   <p:embed/>
                 </p:oleObj>
               </mc:Choice>
@@ -21306,7 +21152,7 @@
           <a:graphicData uri="http://schemas.openxmlformats.org/presentationml/2006/ole">
             <mc:AlternateContent xmlns:mc="http://schemas.openxmlformats.org/markup-compatibility/2006">
               <mc:Choice xmlns:v="urn:schemas-microsoft-com:vml" Requires="v">
-                <p:oleObj spid="_x0000_s5993" name="CS ChemDraw Drawing" r:id="rId5" imgW="589284" imgH="514704" progId="ChemDraw.Document.6.0">
+                <p:oleObj spid="_x0000_s6010" name="CS ChemDraw Drawing" r:id="rId5" imgW="589284" imgH="514704" progId="ChemDraw.Document.6.0">
                   <p:embed/>
                 </p:oleObj>
               </mc:Choice>
@@ -21349,10 +21195,10 @@
       </p:graphicFrame>
       <p:graphicFrame>
         <p:nvGraphicFramePr>
-          <p:cNvPr id="41" name="Object 40">
+          <p:cNvPr id="42" name="Object 41">
             <a:extLst>
               <a:ext uri="{FF2B5EF4-FFF2-40B4-BE49-F238E27FC236}">
-                <a16:creationId xmlns:a16="http://schemas.microsoft.com/office/drawing/2014/main" id="{DE7286B8-7531-43D9-A835-B6BDEF9F53AC}"/>
+                <a16:creationId xmlns:a16="http://schemas.microsoft.com/office/drawing/2014/main" id="{25B60168-F822-4378-A7A7-F9CC9F241180}"/>
               </a:ext>
             </a:extLst>
           </p:cNvPr>
@@ -21362,32 +21208,32 @@
           <p:nvPr>
             <p:extLst>
               <p:ext uri="{D42A27DB-BD31-4B8C-83A1-F6EECF244321}">
-                <p14:modId xmlns:p14="http://schemas.microsoft.com/office/powerpoint/2010/main" val="3865154490"/>
+                <p14:modId xmlns:p14="http://schemas.microsoft.com/office/powerpoint/2010/main" val="3113806416"/>
               </p:ext>
             </p:extLst>
           </p:nvPr>
         </p:nvGraphicFramePr>
         <p:xfrm>
-          <a:off x="5144142" y="3629483"/>
-          <a:ext cx="423863" cy="377825"/>
+          <a:off x="5144142" y="3668046"/>
+          <a:ext cx="423863" cy="349250"/>
         </p:xfrm>
         <a:graphic>
           <a:graphicData uri="http://schemas.openxmlformats.org/presentationml/2006/ole">
             <mc:AlternateContent xmlns:mc="http://schemas.openxmlformats.org/markup-compatibility/2006">
               <mc:Choice xmlns:v="urn:schemas-microsoft-com:vml" Requires="v">
-                <p:oleObj spid="_x0000_s5994" name="CS ChemDraw Drawing" r:id="rId19" imgW="562051" imgH="504104" progId="ChemDraw.Document.6.0">
+                <p:oleObj spid="_x0000_s6011" name="CS ChemDraw Drawing" r:id="rId19" imgW="562051" imgH="467339" progId="ChemDraw.Document.6.0">
                   <p:embed/>
                 </p:oleObj>
               </mc:Choice>
               <mc:Fallback>
-                <p:oleObj name="CS ChemDraw Drawing" r:id="rId19" imgW="562051" imgH="504104" progId="ChemDraw.Document.6.0">
+                <p:oleObj name="CS ChemDraw Drawing" r:id="rId19" imgW="562051" imgH="467339" progId="ChemDraw.Document.6.0">
                   <p:embed/>
                   <p:pic>
                     <p:nvPicPr>
-                      <p:cNvPr id="18" name="Object 17">
+                      <p:cNvPr id="19" name="Object 18">
                         <a:extLst>
                           <a:ext uri="{FF2B5EF4-FFF2-40B4-BE49-F238E27FC236}">
-                            <a16:creationId xmlns:a16="http://schemas.microsoft.com/office/drawing/2014/main" id="{5CAC9B41-36DD-4602-846E-99557642CE9A}"/>
+                            <a16:creationId xmlns:a16="http://schemas.microsoft.com/office/drawing/2014/main" id="{B875EEB3-6751-45EA-B5FA-6E472748C0EE}"/>
                           </a:ext>
                         </a:extLst>
                       </p:cNvPr>
@@ -21402,76 +21248,7 @@
                     </p:blipFill>
                     <p:spPr>
                       <a:xfrm>
-                        <a:off x="5144142" y="3629483"/>
-                        <a:ext cx="423863" cy="377825"/>
-                      </a:xfrm>
-                      <a:prstGeom prst="rect">
-                        <a:avLst/>
-                      </a:prstGeom>
-                    </p:spPr>
-                  </p:pic>
-                </p:oleObj>
-              </mc:Fallback>
-            </mc:AlternateContent>
-          </a:graphicData>
-        </a:graphic>
-      </p:graphicFrame>
-      <p:graphicFrame>
-        <p:nvGraphicFramePr>
-          <p:cNvPr id="42" name="Object 41">
-            <a:extLst>
-              <a:ext uri="{FF2B5EF4-FFF2-40B4-BE49-F238E27FC236}">
-                <a16:creationId xmlns:a16="http://schemas.microsoft.com/office/drawing/2014/main" id="{25B60168-F822-4378-A7A7-F9CC9F241180}"/>
-              </a:ext>
-            </a:extLst>
-          </p:cNvPr>
-          <p:cNvGraphicFramePr>
-            <a:graphicFrameLocks noChangeAspect="1"/>
-          </p:cNvGraphicFramePr>
-          <p:nvPr>
-            <p:extLst>
-              <p:ext uri="{D42A27DB-BD31-4B8C-83A1-F6EECF244321}">
-                <p14:modId xmlns:p14="http://schemas.microsoft.com/office/powerpoint/2010/main" val="2418584106"/>
-              </p:ext>
-            </p:extLst>
-          </p:nvPr>
-        </p:nvGraphicFramePr>
-        <p:xfrm>
-          <a:off x="5144142" y="4115911"/>
-          <a:ext cx="423863" cy="349250"/>
-        </p:xfrm>
-        <a:graphic>
-          <a:graphicData uri="http://schemas.openxmlformats.org/presentationml/2006/ole">
-            <mc:AlternateContent xmlns:mc="http://schemas.openxmlformats.org/markup-compatibility/2006">
-              <mc:Choice xmlns:v="urn:schemas-microsoft-com:vml" Requires="v">
-                <p:oleObj spid="_x0000_s5995" name="CS ChemDraw Drawing" r:id="rId21" imgW="562051" imgH="467339" progId="ChemDraw.Document.6.0">
-                  <p:embed/>
-                </p:oleObj>
-              </mc:Choice>
-              <mc:Fallback>
-                <p:oleObj name="CS ChemDraw Drawing" r:id="rId21" imgW="562051" imgH="467339" progId="ChemDraw.Document.6.0">
-                  <p:embed/>
-                  <p:pic>
-                    <p:nvPicPr>
-                      <p:cNvPr id="19" name="Object 18">
-                        <a:extLst>
-                          <a:ext uri="{FF2B5EF4-FFF2-40B4-BE49-F238E27FC236}">
-                            <a16:creationId xmlns:a16="http://schemas.microsoft.com/office/drawing/2014/main" id="{B875EEB3-6751-45EA-B5FA-6E472748C0EE}"/>
-                          </a:ext>
-                        </a:extLst>
-                      </p:cNvPr>
-                      <p:cNvPicPr/>
-                      <p:nvPr/>
-                    </p:nvPicPr>
-                    <p:blipFill>
-                      <a:blip r:embed="rId22"/>
-                      <a:stretch>
-                        <a:fillRect/>
-                      </a:stretch>
-                    </p:blipFill>
-                    <p:spPr>
-                      <a:xfrm>
-                        <a:off x="5144142" y="4115911"/>
+                        <a:off x="5144142" y="3668046"/>
                         <a:ext cx="423863" cy="349250"/>
                       </a:xfrm>
                       <a:prstGeom prst="rect">
@@ -21500,25 +21277,25 @@
           <p:nvPr>
             <p:extLst>
               <p:ext uri="{D42A27DB-BD31-4B8C-83A1-F6EECF244321}">
-                <p14:modId xmlns:p14="http://schemas.microsoft.com/office/powerpoint/2010/main" val="2969547254"/>
+                <p14:modId xmlns:p14="http://schemas.microsoft.com/office/powerpoint/2010/main" val="3444763132"/>
               </p:ext>
             </p:extLst>
           </p:nvPr>
         </p:nvGraphicFramePr>
         <p:xfrm>
-          <a:off x="5135411" y="5892829"/>
+          <a:off x="5135411" y="5444964"/>
           <a:ext cx="441325" cy="593725"/>
         </p:xfrm>
         <a:graphic>
           <a:graphicData uri="http://schemas.openxmlformats.org/presentationml/2006/ole">
             <mc:AlternateContent xmlns:mc="http://schemas.openxmlformats.org/markup-compatibility/2006">
               <mc:Choice xmlns:v="urn:schemas-microsoft-com:vml" Requires="v">
-                <p:oleObj spid="_x0000_s5996" name="CS ChemDraw Drawing" r:id="rId23" imgW="589284" imgH="788753" progId="ChemDraw.Document.6.0">
+                <p:oleObj spid="_x0000_s6012" name="CS ChemDraw Drawing" r:id="rId21" imgW="589284" imgH="788753" progId="ChemDraw.Document.6.0">
                   <p:embed/>
                 </p:oleObj>
               </mc:Choice>
               <mc:Fallback>
-                <p:oleObj name="CS ChemDraw Drawing" r:id="rId23" imgW="589284" imgH="788753" progId="ChemDraw.Document.6.0">
+                <p:oleObj name="CS ChemDraw Drawing" r:id="rId21" imgW="589284" imgH="788753" progId="ChemDraw.Document.6.0">
                   <p:embed/>
                   <p:pic>
                     <p:nvPicPr>
@@ -21533,14 +21310,14 @@
                       <p:nvPr/>
                     </p:nvPicPr>
                     <p:blipFill>
-                      <a:blip r:embed="rId24"/>
+                      <a:blip r:embed="rId22"/>
                       <a:stretch>
                         <a:fillRect/>
                       </a:stretch>
                     </p:blipFill>
                     <p:spPr>
                       <a:xfrm>
-                        <a:off x="5135411" y="5892829"/>
+                        <a:off x="5135411" y="5444964"/>
                         <a:ext cx="441325" cy="593725"/>
                       </a:xfrm>
                       <a:prstGeom prst="rect">
@@ -21569,25 +21346,25 @@
           <p:nvPr>
             <p:extLst>
               <p:ext uri="{D42A27DB-BD31-4B8C-83A1-F6EECF244321}">
-                <p14:modId xmlns:p14="http://schemas.microsoft.com/office/powerpoint/2010/main" val="1450648642"/>
+                <p14:modId xmlns:p14="http://schemas.microsoft.com/office/powerpoint/2010/main" val="2709969470"/>
               </p:ext>
             </p:extLst>
           </p:nvPr>
         </p:nvGraphicFramePr>
         <p:xfrm>
-          <a:off x="5144142" y="4542805"/>
+          <a:off x="5144142" y="4094940"/>
           <a:ext cx="423862" cy="395288"/>
         </p:xfrm>
         <a:graphic>
           <a:graphicData uri="http://schemas.openxmlformats.org/presentationml/2006/ole">
             <mc:AlternateContent xmlns:mc="http://schemas.openxmlformats.org/markup-compatibility/2006">
               <mc:Choice xmlns:v="urn:schemas-microsoft-com:vml" Requires="v">
-                <p:oleObj spid="_x0000_s5997" name="CS ChemDraw Drawing" r:id="rId25" imgW="562051" imgH="528362" progId="ChemDraw.Document.6.0">
+                <p:oleObj spid="_x0000_s6013" name="CS ChemDraw Drawing" r:id="rId23" imgW="562051" imgH="528362" progId="ChemDraw.Document.6.0">
                   <p:embed/>
                 </p:oleObj>
               </mc:Choice>
               <mc:Fallback>
-                <p:oleObj name="CS ChemDraw Drawing" r:id="rId25" imgW="562051" imgH="528362" progId="ChemDraw.Document.6.0">
+                <p:oleObj name="CS ChemDraw Drawing" r:id="rId23" imgW="562051" imgH="528362" progId="ChemDraw.Document.6.0">
                   <p:embed/>
                   <p:pic>
                     <p:nvPicPr>
@@ -21602,14 +21379,14 @@
                       <p:nvPr/>
                     </p:nvPicPr>
                     <p:blipFill>
-                      <a:blip r:embed="rId26"/>
+                      <a:blip r:embed="rId24"/>
                       <a:stretch>
                         <a:fillRect/>
                       </a:stretch>
                     </p:blipFill>
                     <p:spPr>
                       <a:xfrm>
-                        <a:off x="5144142" y="4542805"/>
+                        <a:off x="5144142" y="4094940"/>
                         <a:ext cx="423862" cy="395288"/>
                       </a:xfrm>
                       <a:prstGeom prst="rect">
@@ -21638,25 +21415,25 @@
           <p:nvPr>
             <p:extLst>
               <p:ext uri="{D42A27DB-BD31-4B8C-83A1-F6EECF244321}">
-                <p14:modId xmlns:p14="http://schemas.microsoft.com/office/powerpoint/2010/main" val="2196614096"/>
+                <p14:modId xmlns:p14="http://schemas.microsoft.com/office/powerpoint/2010/main" val="1604990151"/>
               </p:ext>
             </p:extLst>
           </p:nvPr>
         </p:nvGraphicFramePr>
         <p:xfrm>
-          <a:off x="5017936" y="7044731"/>
+          <a:off x="5017936" y="6596866"/>
           <a:ext cx="676275" cy="387350"/>
         </p:xfrm>
         <a:graphic>
           <a:graphicData uri="http://schemas.openxmlformats.org/presentationml/2006/ole">
             <mc:AlternateContent xmlns:mc="http://schemas.openxmlformats.org/markup-compatibility/2006">
               <mc:Choice xmlns:v="urn:schemas-microsoft-com:vml" Requires="v">
-                <p:oleObj spid="_x0000_s5998" name="CS ChemDraw Drawing" r:id="rId27" imgW="903216" imgH="514717" progId="ChemDraw.Document.6.0">
+                <p:oleObj spid="_x0000_s6014" name="CS ChemDraw Drawing" r:id="rId25" imgW="903216" imgH="514717" progId="ChemDraw.Document.6.0">
                   <p:embed/>
                 </p:oleObj>
               </mc:Choice>
               <mc:Fallback>
-                <p:oleObj name="CS ChemDraw Drawing" r:id="rId27" imgW="903216" imgH="514717" progId="ChemDraw.Document.6.0">
+                <p:oleObj name="CS ChemDraw Drawing" r:id="rId25" imgW="903216" imgH="514717" progId="ChemDraw.Document.6.0">
                   <p:embed/>
                   <p:pic>
                     <p:nvPicPr>
@@ -21671,14 +21448,14 @@
                       <p:nvPr/>
                     </p:nvPicPr>
                     <p:blipFill>
-                      <a:blip r:embed="rId28"/>
+                      <a:blip r:embed="rId26"/>
                       <a:stretch>
                         <a:fillRect/>
                       </a:stretch>
                     </p:blipFill>
                     <p:spPr>
                       <a:xfrm>
-                        <a:off x="5017936" y="7044731"/>
+                        <a:off x="5017936" y="6596866"/>
                         <a:ext cx="676275" cy="387350"/>
                       </a:xfrm>
                       <a:prstGeom prst="rect">
@@ -21707,25 +21484,25 @@
           <p:nvPr>
             <p:extLst>
               <p:ext uri="{D42A27DB-BD31-4B8C-83A1-F6EECF244321}">
-                <p14:modId xmlns:p14="http://schemas.microsoft.com/office/powerpoint/2010/main" val="966256700"/>
+                <p14:modId xmlns:p14="http://schemas.microsoft.com/office/powerpoint/2010/main" val="1325516062"/>
               </p:ext>
             </p:extLst>
           </p:nvPr>
         </p:nvGraphicFramePr>
         <p:xfrm>
-          <a:off x="5017142" y="5001977"/>
+          <a:off x="5017142" y="4554112"/>
           <a:ext cx="677863" cy="422275"/>
         </p:xfrm>
         <a:graphic>
           <a:graphicData uri="http://schemas.openxmlformats.org/presentationml/2006/ole">
             <mc:AlternateContent xmlns:mc="http://schemas.openxmlformats.org/markup-compatibility/2006">
               <mc:Choice xmlns:v="urn:schemas-microsoft-com:vml" Requires="v">
-                <p:oleObj spid="_x0000_s5999" name="CS ChemDraw Drawing" r:id="rId29" imgW="903216" imgH="561716" progId="ChemDraw.Document.6.0">
+                <p:oleObj spid="_x0000_s6015" name="CS ChemDraw Drawing" r:id="rId27" imgW="903216" imgH="561716" progId="ChemDraw.Document.6.0">
                   <p:embed/>
                 </p:oleObj>
               </mc:Choice>
               <mc:Fallback>
-                <p:oleObj name="CS ChemDraw Drawing" r:id="rId29" imgW="903216" imgH="561716" progId="ChemDraw.Document.6.0">
+                <p:oleObj name="CS ChemDraw Drawing" r:id="rId27" imgW="903216" imgH="561716" progId="ChemDraw.Document.6.0">
                   <p:embed/>
                   <p:pic>
                     <p:nvPicPr>
@@ -21740,14 +21517,14 @@
                       <p:nvPr/>
                     </p:nvPicPr>
                     <p:blipFill>
-                      <a:blip r:embed="rId30"/>
+                      <a:blip r:embed="rId28"/>
                       <a:stretch>
                         <a:fillRect/>
                       </a:stretch>
                     </p:blipFill>
                     <p:spPr>
                       <a:xfrm>
-                        <a:off x="5017142" y="5001977"/>
+                        <a:off x="5017142" y="4554112"/>
                         <a:ext cx="677863" cy="422275"/>
                       </a:xfrm>
                       <a:prstGeom prst="rect">
@@ -21776,20 +21553,20 @@
           <p:nvPr>
             <p:extLst>
               <p:ext uri="{D42A27DB-BD31-4B8C-83A1-F6EECF244321}">
-                <p14:modId xmlns:p14="http://schemas.microsoft.com/office/powerpoint/2010/main" val="4038711562"/>
+                <p14:modId xmlns:p14="http://schemas.microsoft.com/office/powerpoint/2010/main" val="1668440247"/>
               </p:ext>
             </p:extLst>
           </p:nvPr>
         </p:nvGraphicFramePr>
         <p:xfrm>
-          <a:off x="5135092" y="5476093"/>
+          <a:off x="5135092" y="5028228"/>
           <a:ext cx="441963" cy="386028"/>
         </p:xfrm>
         <a:graphic>
           <a:graphicData uri="http://schemas.openxmlformats.org/presentationml/2006/ole">
             <mc:AlternateContent xmlns:mc="http://schemas.openxmlformats.org/markup-compatibility/2006">
               <mc:Choice xmlns:v="urn:schemas-microsoft-com:vml" Requires="v">
-                <p:oleObj spid="_x0000_s6000" name="CS ChemDraw Drawing" r:id="rId5" imgW="589284" imgH="514704" progId="ChemDraw.Document.6.0">
+                <p:oleObj spid="_x0000_s6016" name="CS ChemDraw Drawing" r:id="rId5" imgW="589284" imgH="514704" progId="ChemDraw.Document.6.0">
                   <p:embed/>
                 </p:oleObj>
               </mc:Choice>
@@ -21816,7 +21593,7 @@
                     </p:blipFill>
                     <p:spPr>
                       <a:xfrm>
-                        <a:off x="5135092" y="5476093"/>
+                        <a:off x="5135092" y="5028228"/>
                         <a:ext cx="441963" cy="386028"/>
                       </a:xfrm>
                       <a:prstGeom prst="rect">
@@ -21845,20 +21622,20 @@
           <p:nvPr>
             <p:extLst>
               <p:ext uri="{D42A27DB-BD31-4B8C-83A1-F6EECF244321}">
-                <p14:modId xmlns:p14="http://schemas.microsoft.com/office/powerpoint/2010/main" val="3669872503"/>
+                <p14:modId xmlns:p14="http://schemas.microsoft.com/office/powerpoint/2010/main" val="2942366415"/>
               </p:ext>
             </p:extLst>
           </p:nvPr>
         </p:nvGraphicFramePr>
         <p:xfrm>
-          <a:off x="5135092" y="6541793"/>
+          <a:off x="5135092" y="6093928"/>
           <a:ext cx="441963" cy="386028"/>
         </p:xfrm>
         <a:graphic>
           <a:graphicData uri="http://schemas.openxmlformats.org/presentationml/2006/ole">
             <mc:AlternateContent xmlns:mc="http://schemas.openxmlformats.org/markup-compatibility/2006">
               <mc:Choice xmlns:v="urn:schemas-microsoft-com:vml" Requires="v">
-                <p:oleObj spid="_x0000_s6001" name="CS ChemDraw Drawing" r:id="rId5" imgW="589284" imgH="514704" progId="ChemDraw.Document.6.0">
+                <p:oleObj spid="_x0000_s6017" name="CS ChemDraw Drawing" r:id="rId5" imgW="589284" imgH="514704" progId="ChemDraw.Document.6.0">
                   <p:embed/>
                 </p:oleObj>
               </mc:Choice>
@@ -21885,7 +21662,7 @@
                     </p:blipFill>
                     <p:spPr>
                       <a:xfrm>
-                        <a:off x="5135092" y="6541793"/>
+                        <a:off x="5135092" y="6093928"/>
                         <a:ext cx="441963" cy="386028"/>
                       </a:xfrm>
                       <a:prstGeom prst="rect">
@@ -23764,7 +23541,7 @@
           <a:graphicData uri="http://schemas.openxmlformats.org/presentationml/2006/ole">
             <mc:AlternateContent xmlns:mc="http://schemas.openxmlformats.org/markup-compatibility/2006">
               <mc:Choice xmlns:v="urn:schemas-microsoft-com:vml" Requires="v">
-                <p:oleObj spid="_x0000_s26844" name="CS ChemDraw Drawing" r:id="rId3" imgW="1089306" imgH="795196" progId="ChemDraw.Document.6.0">
+                <p:oleObj spid="_x0000_s26856" name="CS ChemDraw Drawing" r:id="rId3" imgW="1089306" imgH="795196" progId="ChemDraw.Document.6.0">
                   <p:embed/>
                 </p:oleObj>
               </mc:Choice>
@@ -23827,7 +23604,7 @@
           <a:graphicData uri="http://schemas.openxmlformats.org/presentationml/2006/ole">
             <mc:AlternateContent xmlns:mc="http://schemas.openxmlformats.org/markup-compatibility/2006">
               <mc:Choice xmlns:v="urn:schemas-microsoft-com:vml" Requires="v">
-                <p:oleObj spid="_x0000_s26845" name="CS ChemDraw Drawing" r:id="rId5" imgW="1089306" imgH="952113" progId="ChemDraw.Document.6.0">
+                <p:oleObj spid="_x0000_s26857" name="CS ChemDraw Drawing" r:id="rId5" imgW="1089306" imgH="952113" progId="ChemDraw.Document.6.0">
                   <p:embed/>
                 </p:oleObj>
               </mc:Choice>
@@ -23890,7 +23667,7 @@
           <a:graphicData uri="http://schemas.openxmlformats.org/presentationml/2006/ole">
             <mc:AlternateContent xmlns:mc="http://schemas.openxmlformats.org/markup-compatibility/2006">
               <mc:Choice xmlns:v="urn:schemas-microsoft-com:vml" Requires="v">
-                <p:oleObj spid="_x0000_s26846" name="CS ChemDraw Drawing" r:id="rId7" imgW="1089306" imgH="1074159" progId="ChemDraw.Document.6.0">
+                <p:oleObj spid="_x0000_s26858" name="CS ChemDraw Drawing" r:id="rId7" imgW="1089306" imgH="1074159" progId="ChemDraw.Document.6.0">
                   <p:embed/>
                 </p:oleObj>
               </mc:Choice>
@@ -23953,7 +23730,7 @@
           <a:graphicData uri="http://schemas.openxmlformats.org/presentationml/2006/ole">
             <mc:AlternateContent xmlns:mc="http://schemas.openxmlformats.org/markup-compatibility/2006">
               <mc:Choice xmlns:v="urn:schemas-microsoft-com:vml" Requires="v">
-                <p:oleObj spid="_x0000_s26847" name="CS ChemDraw Drawing" r:id="rId9" imgW="779913" imgH="566644" progId="ChemDraw.Document.6.0">
+                <p:oleObj spid="_x0000_s26859" name="CS ChemDraw Drawing" r:id="rId9" imgW="779913" imgH="566644" progId="ChemDraw.Document.6.0">
                   <p:embed/>
                 </p:oleObj>
               </mc:Choice>
@@ -24016,7 +23793,7 @@
           <a:graphicData uri="http://schemas.openxmlformats.org/presentationml/2006/ole">
             <mc:AlternateContent xmlns:mc="http://schemas.openxmlformats.org/markup-compatibility/2006">
               <mc:Choice xmlns:v="urn:schemas-microsoft-com:vml" Requires="v">
-                <p:oleObj spid="_x0000_s26848" name="CS ChemDraw Drawing" r:id="rId11" imgW="743224" imgH="514717" progId="ChemDraw.Document.6.0">
+                <p:oleObj spid="_x0000_s26860" name="CS ChemDraw Drawing" r:id="rId11" imgW="743224" imgH="514717" progId="ChemDraw.Document.6.0">
                   <p:embed/>
                 </p:oleObj>
               </mc:Choice>
@@ -24079,7 +23856,7 @@
           <a:graphicData uri="http://schemas.openxmlformats.org/presentationml/2006/ole">
             <mc:AlternateContent xmlns:mc="http://schemas.openxmlformats.org/markup-compatibility/2006">
               <mc:Choice xmlns:v="urn:schemas-microsoft-com:vml" Requires="v">
-                <p:oleObj spid="_x0000_s26849" name="CS ChemDraw Drawing" r:id="rId13" imgW="879009" imgH="568160" progId="ChemDraw.Document.6.0">
+                <p:oleObj spid="_x0000_s26861" name="CS ChemDraw Drawing" r:id="rId13" imgW="879009" imgH="568160" progId="ChemDraw.Document.6.0">
                   <p:embed/>
                 </p:oleObj>
               </mc:Choice>
@@ -24142,7 +23919,7 @@
           <a:graphicData uri="http://schemas.openxmlformats.org/presentationml/2006/ole">
             <mc:AlternateContent xmlns:mc="http://schemas.openxmlformats.org/markup-compatibility/2006">
               <mc:Choice xmlns:v="urn:schemas-microsoft-com:vml" Requires="v">
-                <p:oleObj spid="_x0000_s26850" name="CS ChemDraw Drawing" r:id="rId15" imgW="1089306" imgH="1074159" progId="ChemDraw.Document.6.0">
+                <p:oleObj spid="_x0000_s26862" name="CS ChemDraw Drawing" r:id="rId15" imgW="1089306" imgH="1074159" progId="ChemDraw.Document.6.0">
                   <p:embed/>
                 </p:oleObj>
               </mc:Choice>
@@ -26542,7 +26319,7 @@
           <a:graphicData uri="http://schemas.openxmlformats.org/presentationml/2006/ole">
             <mc:AlternateContent xmlns:mc="http://schemas.openxmlformats.org/markup-compatibility/2006">
               <mc:Choice xmlns:v="urn:schemas-microsoft-com:vml" Requires="v">
-                <p:oleObj spid="_x0000_s26851" name="CS ChemDraw Drawing" r:id="rId17" imgW="1089306" imgH="952113" progId="ChemDraw.Document.6.0">
+                <p:oleObj spid="_x0000_s26863" name="CS ChemDraw Drawing" r:id="rId17" imgW="1089306" imgH="952113" progId="ChemDraw.Document.6.0">
                   <p:embed/>
                 </p:oleObj>
               </mc:Choice>
@@ -26611,7 +26388,7 @@
           <a:graphicData uri="http://schemas.openxmlformats.org/presentationml/2006/ole">
             <mc:AlternateContent xmlns:mc="http://schemas.openxmlformats.org/markup-compatibility/2006">
               <mc:Choice xmlns:v="urn:schemas-microsoft-com:vml" Requires="v">
-                <p:oleObj spid="_x0000_s26852" name="CS ChemDraw Drawing" r:id="rId19" imgW="1089306" imgH="795196" progId="ChemDraw.Document.6.0">
+                <p:oleObj spid="_x0000_s26864" name="CS ChemDraw Drawing" r:id="rId19" imgW="1089306" imgH="795196" progId="ChemDraw.Document.6.0">
                   <p:embed/>
                 </p:oleObj>
               </mc:Choice>
@@ -26680,7 +26457,7 @@
           <a:graphicData uri="http://schemas.openxmlformats.org/presentationml/2006/ole">
             <mc:AlternateContent xmlns:mc="http://schemas.openxmlformats.org/markup-compatibility/2006">
               <mc:Choice xmlns:v="urn:schemas-microsoft-com:vml" Requires="v">
-                <p:oleObj spid="_x0000_s26853" name="CS ChemDraw Drawing" r:id="rId21" imgW="1267452" imgH="795196" progId="ChemDraw.Document.6.0">
+                <p:oleObj spid="_x0000_s26865" name="CS ChemDraw Drawing" r:id="rId21" imgW="1267452" imgH="795196" progId="ChemDraw.Document.6.0">
                   <p:embed/>
                 </p:oleObj>
               </mc:Choice>
@@ -26749,7 +26526,7 @@
           <a:graphicData uri="http://schemas.openxmlformats.org/presentationml/2006/ole">
             <mc:AlternateContent xmlns:mc="http://schemas.openxmlformats.org/markup-compatibility/2006">
               <mc:Choice xmlns:v="urn:schemas-microsoft-com:vml" Requires="v">
-                <p:oleObj spid="_x0000_s26854" name="CS ChemDraw Drawing" r:id="rId23" imgW="942930" imgH="841058" progId="ChemDraw.Document.6.0">
+                <p:oleObj spid="_x0000_s26866" name="CS ChemDraw Drawing" r:id="rId23" imgW="942930" imgH="841058" progId="ChemDraw.Document.6.0">
                   <p:embed/>
                 </p:oleObj>
               </mc:Choice>
@@ -26818,7 +26595,7 @@
           <a:graphicData uri="http://schemas.openxmlformats.org/presentationml/2006/ole">
             <mc:AlternateContent xmlns:mc="http://schemas.openxmlformats.org/markup-compatibility/2006">
               <mc:Choice xmlns:v="urn:schemas-microsoft-com:vml" Requires="v">
-                <p:oleObj spid="_x0000_s26855" name="CS ChemDraw Drawing" r:id="rId25" imgW="1081741" imgH="789132" progId="ChemDraw.Document.6.0">
+                <p:oleObj spid="_x0000_s26867" name="CS ChemDraw Drawing" r:id="rId25" imgW="1081741" imgH="789132" progId="ChemDraw.Document.6.0">
                   <p:embed/>
                 </p:oleObj>
               </mc:Choice>
@@ -28878,7 +28655,7 @@
           <a:graphicData uri="http://schemas.openxmlformats.org/presentationml/2006/ole">
             <mc:AlternateContent xmlns:mc="http://schemas.openxmlformats.org/markup-compatibility/2006">
               <mc:Choice xmlns:v="urn:schemas-microsoft-com:vml" Requires="v">
-                <p:oleObj spid="_x0000_s31751" name="CS ChemDraw Drawing" r:id="rId3" imgW="1362010" imgH="1607449" progId="ChemDraw.Document.6.0">
+                <p:oleObj spid="_x0000_s31756" name="CS ChemDraw Drawing" r:id="rId3" imgW="1362010" imgH="1607449" progId="ChemDraw.Document.6.0">
                   <p:embed/>
                 </p:oleObj>
               </mc:Choice>
@@ -28941,7 +28718,7 @@
           <a:graphicData uri="http://schemas.openxmlformats.org/presentationml/2006/ole">
             <mc:AlternateContent xmlns:mc="http://schemas.openxmlformats.org/markup-compatibility/2006">
               <mc:Choice xmlns:v="urn:schemas-microsoft-com:vml" Requires="v">
-                <p:oleObj spid="_x0000_s31752" name="CS ChemDraw Drawing" r:id="rId5" imgW="1468671" imgH="1424379" progId="ChemDraw.Document.6.0">
+                <p:oleObj spid="_x0000_s31757" name="CS ChemDraw Drawing" r:id="rId5" imgW="1468671" imgH="1424379" progId="ChemDraw.Document.6.0">
                   <p:embed/>
                 </p:oleObj>
               </mc:Choice>
@@ -29004,7 +28781,7 @@
           <a:graphicData uri="http://schemas.openxmlformats.org/presentationml/2006/ole">
             <mc:AlternateContent xmlns:mc="http://schemas.openxmlformats.org/markup-compatibility/2006">
               <mc:Choice xmlns:v="urn:schemas-microsoft-com:vml" Requires="v">
-                <p:oleObj spid="_x0000_s31753" name="CS ChemDraw Drawing" r:id="rId7" imgW="1089306" imgH="1068095" progId="ChemDraw.Document.6.0">
+                <p:oleObj spid="_x0000_s31758" name="CS ChemDraw Drawing" r:id="rId7" imgW="1089306" imgH="1068095" progId="ChemDraw.Document.6.0">
                   <p:embed/>
                 </p:oleObj>
               </mc:Choice>
@@ -29067,7 +28844,7 @@
           <a:graphicData uri="http://schemas.openxmlformats.org/presentationml/2006/ole">
             <mc:AlternateContent xmlns:mc="http://schemas.openxmlformats.org/markup-compatibility/2006">
               <mc:Choice xmlns:v="urn:schemas-microsoft-com:vml" Requires="v">
-                <p:oleObj spid="_x0000_s31754" name="CS ChemDraw Drawing" r:id="rId9" imgW="904729" imgH="567781" progId="ChemDraw.Document.6.0">
+                <p:oleObj spid="_x0000_s31759" name="CS ChemDraw Drawing" r:id="rId9" imgW="904729" imgH="567781" progId="ChemDraw.Document.6.0">
                   <p:embed/>
                 </p:oleObj>
               </mc:Choice>
@@ -29130,7 +28907,7 @@
           <a:graphicData uri="http://schemas.openxmlformats.org/presentationml/2006/ole">
             <mc:AlternateContent xmlns:mc="http://schemas.openxmlformats.org/markup-compatibility/2006">
               <mc:Choice xmlns:v="urn:schemas-microsoft-com:vml" Requires="v">
-                <p:oleObj spid="_x0000_s31755" name="CS ChemDraw Drawing" r:id="rId11" imgW="746250" imgH="423372" progId="ChemDraw.Document.6.0">
+                <p:oleObj spid="_x0000_s31760" name="CS ChemDraw Drawing" r:id="rId11" imgW="746250" imgH="423372" progId="ChemDraw.Document.6.0">
                   <p:embed/>
                 </p:oleObj>
               </mc:Choice>

</xml_diff>